<commit_message>
final changes and submission
</commit_message>
<xml_diff>
--- a/Horse_Racing.pptx
+++ b/Horse_Racing.pptx
@@ -6498,16 +6498,86 @@
             <p:ph type="title"/>
           </p:nvPr>
         </p:nvSpPr>
-        <p:spPr/>
-        <p:txBody>
-          <a:bodyPr/>
+        <p:spPr>
+          <a:xfrm>
+            <a:off x="298764" y="337965"/>
+            <a:ext cx="11561276" cy="1325563"/>
+          </a:xfrm>
+        </p:spPr>
+        <p:txBody>
+          <a:bodyPr>
+            <a:normAutofit fontScale="90000"/>
+          </a:bodyPr>
           <a:lstStyle/>
           <a:p>
             <a:r>
               <a:rPr lang="en-US" dirty="0"/>
-              <a:t>DROPPED COLUMNS</a:t>
-            </a:r>
-            <a:endParaRPr lang="en-GB" dirty="0"/>
+              <a:t>DROPPED COLUMNS:</a:t>
+            </a:r>
+            <a:br>
+              <a:rPr lang="en-US" dirty="0"/>
+            </a:br>
+            <a:r>
+              <a:rPr lang="en-US" sz="2000" dirty="0"/>
+              <a:t>A review of the column data was performed and those features that were duplicates in meaning e.g. </a:t>
+            </a:r>
+            <a:br>
+              <a:rPr lang="en-US" sz="2000" dirty="0"/>
+            </a:br>
+            <a:r>
+              <a:rPr lang="en-US" sz="2000" dirty="0"/>
+              <a:t>columns with heading month, time, year were dropped and instead only 'Date' was kept. </a:t>
+            </a:r>
+            <a:br>
+              <a:rPr lang="en-US" sz="2000" dirty="0"/>
+            </a:br>
+            <a:r>
+              <a:rPr lang="en-US" sz="2000" dirty="0"/>
+              <a:t>Also </a:t>
+            </a:r>
+            <a:r>
+              <a:rPr lang="en-US" sz="2000" dirty="0" err="1"/>
+              <a:t>dist.f</a:t>
+            </a:r>
+            <a:r>
+              <a:rPr lang="en-US" sz="2000" dirty="0"/>
+              <a:t> (distance in furlong) was dropped and </a:t>
+            </a:r>
+            <a:r>
+              <a:rPr lang="en-US" sz="2000" dirty="0" err="1"/>
+              <a:t>dist.m</a:t>
+            </a:r>
+            <a:r>
+              <a:rPr lang="en-US" sz="2000" dirty="0"/>
+              <a:t> (distance in </a:t>
+            </a:r>
+            <a:r>
+              <a:rPr lang="en-US" sz="2000" dirty="0" err="1"/>
+              <a:t>metres</a:t>
+            </a:r>
+            <a:r>
+              <a:rPr lang="en-US" sz="2000" dirty="0"/>
+              <a:t>) was kept. </a:t>
+            </a:r>
+            <a:br>
+              <a:rPr lang="en-US" sz="2000" dirty="0"/>
+            </a:br>
+            <a:r>
+              <a:rPr lang="en-US" sz="2000" dirty="0"/>
+              <a:t>Other features were dropped based on the </a:t>
+            </a:r>
+            <a:r>
+              <a:rPr lang="en-US" sz="2000"/>
+              <a:t>same assessment.</a:t>
+            </a:r>
+            <a:br>
+              <a:rPr lang="en-US" sz="2000" dirty="0"/>
+            </a:br>
+            <a:r>
+              <a:rPr lang="en-US" sz="2000" dirty="0"/>
+              <a:t>Having duplicate meanings in features would not have added value to the model. </a:t>
+            </a:r>
+            <a:endParaRPr lang="en-GB" sz="2000" dirty="0"/>
           </a:p>
         </p:txBody>
       </p:sp>
@@ -6541,8 +6611,8 @@
         </p:blipFill>
         <p:spPr>
           <a:xfrm>
-            <a:off x="676781" y="1253331"/>
-            <a:ext cx="11226747" cy="5474040"/>
+            <a:off x="298764" y="1955550"/>
+            <a:ext cx="11631925" cy="4780874"/>
           </a:xfrm>
         </p:spPr>
       </p:pic>

</xml_diff>